<commit_message>
exam-rules.md all-slides.pdf exam.pdf exam.pptx
</commit_message>
<xml_diff>
--- a/ipsa/slides/exam.pptx
+++ b/ipsa/slides/exam.pptx
@@ -122,9 +122,53 @@
 <file path=ppt/revisionInfo.xml><?xml version="1.0" encoding="utf-8"?>
 <p1510:revInfo xmlns:a="http://schemas.openxmlformats.org/drawingml/2006/main" xmlns:r="http://schemas.openxmlformats.org/officeDocument/2006/relationships" xmlns:p1510="http://schemas.microsoft.com/office/powerpoint/2015/10/main">
   <p1510:revLst>
-    <p1510:client id="{AEBCE241-0C9B-42CB-98DA-24B780B91397}" v="365" dt="2023-05-12T06:43:36.903"/>
+    <p1510:client id="{950DEF30-CF5D-4D94-85A1-31677B492C68}" v="1" dt="2024-05-11T19:22:04.731"/>
   </p1510:revLst>
 </p1510:revInfo>
+</file>
+
+<file path=ppt/changesInfos/changesInfo1.xml><?xml version="1.0" encoding="utf-8"?>
+<pc:chgInfo xmlns:a="http://schemas.openxmlformats.org/drawingml/2006/main" xmlns:r="http://schemas.openxmlformats.org/officeDocument/2006/relationships" xmlns:ac="http://schemas.microsoft.com/office/drawing/2013/main/command" xmlns:pc="http://schemas.microsoft.com/office/powerpoint/2013/main/command">
+  <pc:docChgLst>
+    <pc:chgData name="Gerth Stølting Brodal" userId="04ef4784-6591-4f86-a140-f5c3b108582a" providerId="ADAL" clId="{950DEF30-CF5D-4D94-85A1-31677B492C68}"/>
+    <pc:docChg chg="undo custSel modSld">
+      <pc:chgData name="Gerth Stølting Brodal" userId="04ef4784-6591-4f86-a140-f5c3b108582a" providerId="ADAL" clId="{950DEF30-CF5D-4D94-85A1-31677B492C68}" dt="2024-05-11T19:22:44.268" v="62" actId="20577"/>
+      <pc:docMkLst>
+        <pc:docMk/>
+      </pc:docMkLst>
+      <pc:sldChg chg="modSp mod">
+        <pc:chgData name="Gerth Stølting Brodal" userId="04ef4784-6591-4f86-a140-f5c3b108582a" providerId="ADAL" clId="{950DEF30-CF5D-4D94-85A1-31677B492C68}" dt="2024-05-11T19:17:54.177" v="9" actId="20577"/>
+        <pc:sldMkLst>
+          <pc:docMk/>
+          <pc:sldMk cId="1038163257" sldId="475"/>
+        </pc:sldMkLst>
+        <pc:spChg chg="mod">
+          <ac:chgData name="Gerth Stølting Brodal" userId="04ef4784-6591-4f86-a140-f5c3b108582a" providerId="ADAL" clId="{950DEF30-CF5D-4D94-85A1-31677B492C68}" dt="2024-05-11T19:17:54.177" v="9" actId="20577"/>
+          <ac:spMkLst>
+            <pc:docMk/>
+            <pc:sldMk cId="1038163257" sldId="475"/>
+            <ac:spMk id="3" creationId="{00000000-0000-0000-0000-000000000000}"/>
+          </ac:spMkLst>
+        </pc:spChg>
+      </pc:sldChg>
+      <pc:sldChg chg="modSp mod">
+        <pc:chgData name="Gerth Stølting Brodal" userId="04ef4784-6591-4f86-a140-f5c3b108582a" providerId="ADAL" clId="{950DEF30-CF5D-4D94-85A1-31677B492C68}" dt="2024-05-11T19:22:44.268" v="62" actId="20577"/>
+        <pc:sldMkLst>
+          <pc:docMk/>
+          <pc:sldMk cId="1270503327" sldId="703"/>
+        </pc:sldMkLst>
+        <pc:spChg chg="mod">
+          <ac:chgData name="Gerth Stølting Brodal" userId="04ef4784-6591-4f86-a140-f5c3b108582a" providerId="ADAL" clId="{950DEF30-CF5D-4D94-85A1-31677B492C68}" dt="2024-05-11T19:22:44.268" v="62" actId="20577"/>
+          <ac:spMkLst>
+            <pc:docMk/>
+            <pc:sldMk cId="1270503327" sldId="703"/>
+            <ac:spMk id="3" creationId="{00000000-0000-0000-0000-000000000000}"/>
+          </ac:spMkLst>
+        </pc:spChg>
+      </pc:sldChg>
+    </pc:docChg>
+  </pc:docChgLst>
+</pc:chgInfo>
 </file>
 
 <file path=ppt/notesMasters/notesMaster1.xml><?xml version="1.0" encoding="utf-8"?>
@@ -209,7 +253,7 @@
           <a:p>
             <a:fld id="{FB1A172F-81D4-4DC4-9113-1DBD56EC3646}" type="datetimeFigureOut">
               <a:rPr lang="en-US" smtClean="0"/>
-              <a:t>5/12/2023</a:t>
+              <a:t>5/11/2024</a:t>
             </a:fld>
             <a:endParaRPr lang="en-US"/>
           </a:p>
@@ -799,7 +843,7 @@
           <a:p>
             <a:fld id="{0560A9CD-0304-4E0B-9E82-E7E0115DE05B}" type="datetimeFigureOut">
               <a:rPr lang="en-US" smtClean="0"/>
-              <a:t>5/12/2023</a:t>
+              <a:t>5/11/2024</a:t>
             </a:fld>
             <a:endParaRPr lang="en-US"/>
           </a:p>
@@ -967,7 +1011,7 @@
           <a:p>
             <a:fld id="{0560A9CD-0304-4E0B-9E82-E7E0115DE05B}" type="datetimeFigureOut">
               <a:rPr lang="en-US" smtClean="0"/>
-              <a:t>5/12/2023</a:t>
+              <a:t>5/11/2024</a:t>
             </a:fld>
             <a:endParaRPr lang="en-US"/>
           </a:p>
@@ -1145,7 +1189,7 @@
           <a:p>
             <a:fld id="{0560A9CD-0304-4E0B-9E82-E7E0115DE05B}" type="datetimeFigureOut">
               <a:rPr lang="en-US" smtClean="0"/>
-              <a:t>5/12/2023</a:t>
+              <a:t>5/11/2024</a:t>
             </a:fld>
             <a:endParaRPr lang="en-US"/>
           </a:p>
@@ -1328,7 +1372,7 @@
           <a:p>
             <a:fld id="{0560A9CD-0304-4E0B-9E82-E7E0115DE05B}" type="datetimeFigureOut">
               <a:rPr lang="en-US" smtClean="0"/>
-              <a:t>5/12/2023</a:t>
+              <a:t>5/11/2024</a:t>
             </a:fld>
             <a:endParaRPr lang="en-US"/>
           </a:p>
@@ -1573,7 +1617,7 @@
           <a:p>
             <a:fld id="{0560A9CD-0304-4E0B-9E82-E7E0115DE05B}" type="datetimeFigureOut">
               <a:rPr lang="en-US" smtClean="0"/>
-              <a:t>5/12/2023</a:t>
+              <a:t>5/11/2024</a:t>
             </a:fld>
             <a:endParaRPr lang="en-US"/>
           </a:p>
@@ -1802,7 +1846,7 @@
           <a:p>
             <a:fld id="{0560A9CD-0304-4E0B-9E82-E7E0115DE05B}" type="datetimeFigureOut">
               <a:rPr lang="en-US" smtClean="0"/>
-              <a:t>5/12/2023</a:t>
+              <a:t>5/11/2024</a:t>
             </a:fld>
             <a:endParaRPr lang="en-US"/>
           </a:p>
@@ -2166,7 +2210,7 @@
           <a:p>
             <a:fld id="{0560A9CD-0304-4E0B-9E82-E7E0115DE05B}" type="datetimeFigureOut">
               <a:rPr lang="en-US" smtClean="0"/>
-              <a:t>5/12/2023</a:t>
+              <a:t>5/11/2024</a:t>
             </a:fld>
             <a:endParaRPr lang="en-US"/>
           </a:p>
@@ -2283,7 +2327,7 @@
           <a:p>
             <a:fld id="{0560A9CD-0304-4E0B-9E82-E7E0115DE05B}" type="datetimeFigureOut">
               <a:rPr lang="en-US" smtClean="0"/>
-              <a:t>5/12/2023</a:t>
+              <a:t>5/11/2024</a:t>
             </a:fld>
             <a:endParaRPr lang="en-US"/>
           </a:p>
@@ -2378,7 +2422,7 @@
           <a:p>
             <a:fld id="{0560A9CD-0304-4E0B-9E82-E7E0115DE05B}" type="datetimeFigureOut">
               <a:rPr lang="en-US" smtClean="0"/>
-              <a:t>5/12/2023</a:t>
+              <a:t>5/11/2024</a:t>
             </a:fld>
             <a:endParaRPr lang="en-US"/>
           </a:p>
@@ -2653,7 +2697,7 @@
           <a:p>
             <a:fld id="{0560A9CD-0304-4E0B-9E82-E7E0115DE05B}" type="datetimeFigureOut">
               <a:rPr lang="en-US" smtClean="0"/>
-              <a:t>5/12/2023</a:t>
+              <a:t>5/11/2024</a:t>
             </a:fld>
             <a:endParaRPr lang="en-US"/>
           </a:p>
@@ -2905,7 +2949,7 @@
           <a:p>
             <a:fld id="{0560A9CD-0304-4E0B-9E82-E7E0115DE05B}" type="datetimeFigureOut">
               <a:rPr lang="en-US" smtClean="0"/>
-              <a:t>5/12/2023</a:t>
+              <a:t>5/11/2024</a:t>
             </a:fld>
             <a:endParaRPr lang="en-US"/>
           </a:p>
@@ -3116,7 +3160,7 @@
           <a:p>
             <a:fld id="{0560A9CD-0304-4E0B-9E82-E7E0115DE05B}" type="datetimeFigureOut">
               <a:rPr lang="en-US" smtClean="0"/>
-              <a:t>5/12/2023</a:t>
+              <a:t>5/11/2024</a:t>
             </a:fld>
             <a:endParaRPr lang="en-US"/>
           </a:p>
@@ -3553,13 +3597,13 @@
             </a:r>
             <a:r>
               <a:rPr lang="en-US" dirty="0"/>
-              <a:t>, deadline 19 May 2023</a:t>
+              <a:t>, deadline 17 May 2024</a:t>
             </a:r>
           </a:p>
           <a:p>
             <a:r>
               <a:rPr lang="en-US" dirty="0"/>
-              <a:t>Final project, deadline 31 May 2023</a:t>
+              <a:t>Final project, deadline 31 May 2024</a:t>
             </a:r>
             <a:endParaRPr lang="en-US" baseline="30000" dirty="0"/>
           </a:p>
@@ -3572,7 +3616,7 @@
           <a:p>
             <a:r>
               <a:rPr lang="en-US" dirty="0"/>
-              <a:t>Exam, 17 June 2023</a:t>
+              <a:t>Exam, 15 June 2024</a:t>
             </a:r>
           </a:p>
           <a:p>
@@ -3739,14 +3783,20 @@
           </a:p>
           <a:p>
             <a:r>
+              <a:rPr lang="en-US" b="1" dirty="0" err="1">
+                <a:hlinkClick r:id="rId3"/>
+              </a:rPr>
+              <a:t>WISEflow</a:t>
+            </a:r>
+            <a:r>
               <a:rPr lang="en-US" b="1" dirty="0">
                 <a:hlinkClick r:id="rId3"/>
               </a:rPr>
-              <a:t>ITX Flex</a:t>
+              <a:t> Device Monitor </a:t>
             </a:r>
             <a:r>
               <a:rPr lang="en-US" b="1" dirty="0"/>
-              <a:t> must be enabled</a:t>
+              <a:t>must be enabled</a:t>
             </a:r>
           </a:p>
           <a:p>
@@ -3801,7 +3851,7 @@
           <a:p>
             <a:r>
               <a:rPr lang="da-DK" dirty="0"/>
-              <a:t>eksamen.au.dk</a:t>
+              <a:t>wiseflow.au.dk</a:t>
             </a:r>
           </a:p>
           <a:p>

</xml_diff>

<commit_message>
all-slides.pdf exam.pdf exam.pptx final_lecture.pdf final_lecture.pptx
</commit_message>
<xml_diff>
--- a/ipsa/slides/exam.pptx
+++ b/ipsa/slides/exam.pptx
@@ -119,16 +119,32 @@
 </p:presentation>
 </file>
 
-<file path=ppt/revisionInfo.xml><?xml version="1.0" encoding="utf-8"?>
-<p1510:revInfo xmlns:a="http://schemas.openxmlformats.org/drawingml/2006/main" xmlns:r="http://schemas.openxmlformats.org/officeDocument/2006/relationships" xmlns:p1510="http://schemas.microsoft.com/office/powerpoint/2015/10/main">
-  <p1510:revLst>
-    <p1510:client id="{950DEF30-CF5D-4D94-85A1-31677B492C68}" v="1" dt="2024-05-11T19:22:04.731"/>
-  </p1510:revLst>
-</p1510:revInfo>
-</file>
-
 <file path=ppt/changesInfos/changesInfo1.xml><?xml version="1.0" encoding="utf-8"?>
 <pc:chgInfo xmlns:a="http://schemas.openxmlformats.org/drawingml/2006/main" xmlns:r="http://schemas.openxmlformats.org/officeDocument/2006/relationships" xmlns:ac="http://schemas.microsoft.com/office/drawing/2013/main/command" xmlns:pc="http://schemas.microsoft.com/office/powerpoint/2013/main/command">
+  <pc:docChgLst>
+    <pc:chgData name="Gerth Stølting Brodal" userId="04ef4784-6591-4f86-a140-f5c3b108582a" providerId="ADAL" clId="{C4255131-8370-4D90-A2CA-678348A29EAF}"/>
+    <pc:docChg chg="modSld">
+      <pc:chgData name="Gerth Stølting Brodal" userId="04ef4784-6591-4f86-a140-f5c3b108582a" providerId="ADAL" clId="{C4255131-8370-4D90-A2CA-678348A29EAF}" dt="2025-05-11T11:33:02.321" v="11" actId="20577"/>
+      <pc:docMkLst>
+        <pc:docMk/>
+      </pc:docMkLst>
+      <pc:sldChg chg="modSp mod">
+        <pc:chgData name="Gerth Stølting Brodal" userId="04ef4784-6591-4f86-a140-f5c3b108582a" providerId="ADAL" clId="{C4255131-8370-4D90-A2CA-678348A29EAF}" dt="2025-05-11T11:33:02.321" v="11" actId="20577"/>
+        <pc:sldMkLst>
+          <pc:docMk/>
+          <pc:sldMk cId="1038163257" sldId="475"/>
+        </pc:sldMkLst>
+        <pc:spChg chg="mod">
+          <ac:chgData name="Gerth Stølting Brodal" userId="04ef4784-6591-4f86-a140-f5c3b108582a" providerId="ADAL" clId="{C4255131-8370-4D90-A2CA-678348A29EAF}" dt="2025-05-11T11:33:02.321" v="11" actId="20577"/>
+          <ac:spMkLst>
+            <pc:docMk/>
+            <pc:sldMk cId="1038163257" sldId="475"/>
+            <ac:spMk id="3" creationId="{00000000-0000-0000-0000-000000000000}"/>
+          </ac:spMkLst>
+        </pc:spChg>
+      </pc:sldChg>
+    </pc:docChg>
+  </pc:docChgLst>
   <pc:docChgLst>
     <pc:chgData name="Gerth Stølting Brodal" userId="04ef4784-6591-4f86-a140-f5c3b108582a" providerId="ADAL" clId="{950DEF30-CF5D-4D94-85A1-31677B492C68}"/>
     <pc:docChg chg="undo custSel modSld">
@@ -142,14 +158,6 @@
           <pc:docMk/>
           <pc:sldMk cId="1038163257" sldId="475"/>
         </pc:sldMkLst>
-        <pc:spChg chg="mod">
-          <ac:chgData name="Gerth Stølting Brodal" userId="04ef4784-6591-4f86-a140-f5c3b108582a" providerId="ADAL" clId="{950DEF30-CF5D-4D94-85A1-31677B492C68}" dt="2024-05-11T19:17:54.177" v="9" actId="20577"/>
-          <ac:spMkLst>
-            <pc:docMk/>
-            <pc:sldMk cId="1038163257" sldId="475"/>
-            <ac:spMk id="3" creationId="{00000000-0000-0000-0000-000000000000}"/>
-          </ac:spMkLst>
-        </pc:spChg>
       </pc:sldChg>
       <pc:sldChg chg="modSp mod modNotesTx">
         <pc:chgData name="Gerth Stølting Brodal" userId="04ef4784-6591-4f86-a140-f5c3b108582a" providerId="ADAL" clId="{950DEF30-CF5D-4D94-85A1-31677B492C68}" dt="2024-05-13T07:01:49.743" v="64" actId="20577"/>
@@ -157,14 +165,6 @@
           <pc:docMk/>
           <pc:sldMk cId="1270503327" sldId="703"/>
         </pc:sldMkLst>
-        <pc:spChg chg="mod">
-          <ac:chgData name="Gerth Stølting Brodal" userId="04ef4784-6591-4f86-a140-f5c3b108582a" providerId="ADAL" clId="{950DEF30-CF5D-4D94-85A1-31677B492C68}" dt="2024-05-11T19:22:44.268" v="62" actId="20577"/>
-          <ac:spMkLst>
-            <pc:docMk/>
-            <pc:sldMk cId="1270503327" sldId="703"/>
-            <ac:spMk id="3" creationId="{00000000-0000-0000-0000-000000000000}"/>
-          </ac:spMkLst>
-        </pc:spChg>
       </pc:sldChg>
     </pc:docChg>
   </pc:docChgLst>
@@ -253,7 +253,7 @@
           <a:p>
             <a:fld id="{FB1A172F-81D4-4DC4-9113-1DBD56EC3646}" type="datetimeFigureOut">
               <a:rPr lang="en-US" smtClean="0"/>
-              <a:t>5/13/2024</a:t>
+              <a:t>5/11/2025</a:t>
             </a:fld>
             <a:endParaRPr lang="en-US"/>
           </a:p>
@@ -825,7 +825,7 @@
           <a:p>
             <a:fld id="{0560A9CD-0304-4E0B-9E82-E7E0115DE05B}" type="datetimeFigureOut">
               <a:rPr lang="en-US" smtClean="0"/>
-              <a:t>5/13/2024</a:t>
+              <a:t>5/11/2025</a:t>
             </a:fld>
             <a:endParaRPr lang="en-US"/>
           </a:p>
@@ -993,7 +993,7 @@
           <a:p>
             <a:fld id="{0560A9CD-0304-4E0B-9E82-E7E0115DE05B}" type="datetimeFigureOut">
               <a:rPr lang="en-US" smtClean="0"/>
-              <a:t>5/13/2024</a:t>
+              <a:t>5/11/2025</a:t>
             </a:fld>
             <a:endParaRPr lang="en-US"/>
           </a:p>
@@ -1171,7 +1171,7 @@
           <a:p>
             <a:fld id="{0560A9CD-0304-4E0B-9E82-E7E0115DE05B}" type="datetimeFigureOut">
               <a:rPr lang="en-US" smtClean="0"/>
-              <a:t>5/13/2024</a:t>
+              <a:t>5/11/2025</a:t>
             </a:fld>
             <a:endParaRPr lang="en-US"/>
           </a:p>
@@ -1354,7 +1354,7 @@
           <a:p>
             <a:fld id="{0560A9CD-0304-4E0B-9E82-E7E0115DE05B}" type="datetimeFigureOut">
               <a:rPr lang="en-US" smtClean="0"/>
-              <a:t>5/13/2024</a:t>
+              <a:t>5/11/2025</a:t>
             </a:fld>
             <a:endParaRPr lang="en-US"/>
           </a:p>
@@ -1599,7 +1599,7 @@
           <a:p>
             <a:fld id="{0560A9CD-0304-4E0B-9E82-E7E0115DE05B}" type="datetimeFigureOut">
               <a:rPr lang="en-US" smtClean="0"/>
-              <a:t>5/13/2024</a:t>
+              <a:t>5/11/2025</a:t>
             </a:fld>
             <a:endParaRPr lang="en-US"/>
           </a:p>
@@ -1828,7 +1828,7 @@
           <a:p>
             <a:fld id="{0560A9CD-0304-4E0B-9E82-E7E0115DE05B}" type="datetimeFigureOut">
               <a:rPr lang="en-US" smtClean="0"/>
-              <a:t>5/13/2024</a:t>
+              <a:t>5/11/2025</a:t>
             </a:fld>
             <a:endParaRPr lang="en-US"/>
           </a:p>
@@ -2192,7 +2192,7 @@
           <a:p>
             <a:fld id="{0560A9CD-0304-4E0B-9E82-E7E0115DE05B}" type="datetimeFigureOut">
               <a:rPr lang="en-US" smtClean="0"/>
-              <a:t>5/13/2024</a:t>
+              <a:t>5/11/2025</a:t>
             </a:fld>
             <a:endParaRPr lang="en-US"/>
           </a:p>
@@ -2309,7 +2309,7 @@
           <a:p>
             <a:fld id="{0560A9CD-0304-4E0B-9E82-E7E0115DE05B}" type="datetimeFigureOut">
               <a:rPr lang="en-US" smtClean="0"/>
-              <a:t>5/13/2024</a:t>
+              <a:t>5/11/2025</a:t>
             </a:fld>
             <a:endParaRPr lang="en-US"/>
           </a:p>
@@ -2404,7 +2404,7 @@
           <a:p>
             <a:fld id="{0560A9CD-0304-4E0B-9E82-E7E0115DE05B}" type="datetimeFigureOut">
               <a:rPr lang="en-US" smtClean="0"/>
-              <a:t>5/13/2024</a:t>
+              <a:t>5/11/2025</a:t>
             </a:fld>
             <a:endParaRPr lang="en-US"/>
           </a:p>
@@ -2679,7 +2679,7 @@
           <a:p>
             <a:fld id="{0560A9CD-0304-4E0B-9E82-E7E0115DE05B}" type="datetimeFigureOut">
               <a:rPr lang="en-US" smtClean="0"/>
-              <a:t>5/13/2024</a:t>
+              <a:t>5/11/2025</a:t>
             </a:fld>
             <a:endParaRPr lang="en-US"/>
           </a:p>
@@ -2931,7 +2931,7 @@
           <a:p>
             <a:fld id="{0560A9CD-0304-4E0B-9E82-E7E0115DE05B}" type="datetimeFigureOut">
               <a:rPr lang="en-US" smtClean="0"/>
-              <a:t>5/13/2024</a:t>
+              <a:t>5/11/2025</a:t>
             </a:fld>
             <a:endParaRPr lang="en-US"/>
           </a:p>
@@ -3142,7 +3142,7 @@
           <a:p>
             <a:fld id="{0560A9CD-0304-4E0B-9E82-E7E0115DE05B}" type="datetimeFigureOut">
               <a:rPr lang="en-US" smtClean="0"/>
-              <a:t>5/13/2024</a:t>
+              <a:t>5/11/2025</a:t>
             </a:fld>
             <a:endParaRPr lang="en-US"/>
           </a:p>
@@ -3579,13 +3579,13 @@
             </a:r>
             <a:r>
               <a:rPr lang="en-US" dirty="0"/>
-              <a:t>, deadline 17 May 2024</a:t>
+              <a:t>, deadline 16 May 2025</a:t>
             </a:r>
           </a:p>
           <a:p>
             <a:r>
               <a:rPr lang="en-US" dirty="0"/>
-              <a:t>Final project, deadline 31 May 2024</a:t>
+              <a:t>Final project, deadline 31 May 2025</a:t>
             </a:r>
             <a:endParaRPr lang="en-US" baseline="30000" dirty="0"/>
           </a:p>
@@ -3598,7 +3598,7 @@
           <a:p>
             <a:r>
               <a:rPr lang="en-US" dirty="0"/>
-              <a:t>Exam, 15 June 2024</a:t>
+              <a:t>Exam, 14 June 2025</a:t>
             </a:r>
           </a:p>
           <a:p>

</xml_diff>

<commit_message>
__README__.txt exam-rules.md all-slides-with-answers.pdf all-slides.pdf exam.pdf exam.pptx introduction.pdf introduction.pptx
</commit_message>
<xml_diff>
--- a/ipsa/slides/exam.pptx
+++ b/ipsa/slides/exam.pptx
@@ -122,20 +122,20 @@
 <file path=ppt/changesInfos/changesInfo1.xml><?xml version="1.0" encoding="utf-8"?>
 <pc:chgInfo xmlns:a="http://schemas.openxmlformats.org/drawingml/2006/main" xmlns:r="http://schemas.openxmlformats.org/officeDocument/2006/relationships" xmlns:ac="http://schemas.microsoft.com/office/drawing/2013/main/command" xmlns:pc="http://schemas.microsoft.com/office/powerpoint/2013/main/command">
   <pc:docChgLst>
-    <pc:chgData name="Gerth Stølting Brodal" userId="04ef4784-6591-4f86-a140-f5c3b108582a" providerId="ADAL" clId="{C4255131-8370-4D90-A2CA-678348A29EAF}"/>
+    <pc:chgData name="Gerth Stølting Brodal" userId="04ef4784-6591-4f86-a140-f5c3b108582a" providerId="ADAL" clId="{EE2C17C0-1D70-424E-A6AD-F76FBCBC6F35}"/>
     <pc:docChg chg="modSld">
-      <pc:chgData name="Gerth Stølting Brodal" userId="04ef4784-6591-4f86-a140-f5c3b108582a" providerId="ADAL" clId="{C4255131-8370-4D90-A2CA-678348A29EAF}" dt="2025-05-11T11:33:02.321" v="11" actId="20577"/>
+      <pc:chgData name="Gerth Stølting Brodal" userId="04ef4784-6591-4f86-a140-f5c3b108582a" providerId="ADAL" clId="{EE2C17C0-1D70-424E-A6AD-F76FBCBC6F35}" dt="2026-01-24T00:01:39.536" v="81" actId="1036"/>
       <pc:docMkLst>
         <pc:docMk/>
       </pc:docMkLst>
       <pc:sldChg chg="modSp mod">
-        <pc:chgData name="Gerth Stølting Brodal" userId="04ef4784-6591-4f86-a140-f5c3b108582a" providerId="ADAL" clId="{C4255131-8370-4D90-A2CA-678348A29EAF}" dt="2025-05-11T11:33:02.321" v="11" actId="20577"/>
+        <pc:chgData name="Gerth Stølting Brodal" userId="04ef4784-6591-4f86-a140-f5c3b108582a" providerId="ADAL" clId="{EE2C17C0-1D70-424E-A6AD-F76FBCBC6F35}" dt="2026-01-23T23:58:03.534" v="13" actId="20577"/>
         <pc:sldMkLst>
           <pc:docMk/>
           <pc:sldMk cId="1038163257" sldId="475"/>
         </pc:sldMkLst>
         <pc:spChg chg="mod">
-          <ac:chgData name="Gerth Stølting Brodal" userId="04ef4784-6591-4f86-a140-f5c3b108582a" providerId="ADAL" clId="{C4255131-8370-4D90-A2CA-678348A29EAF}" dt="2025-05-11T11:33:02.321" v="11" actId="20577"/>
+          <ac:chgData name="Gerth Stølting Brodal" userId="04ef4784-6591-4f86-a140-f5c3b108582a" providerId="ADAL" clId="{EE2C17C0-1D70-424E-A6AD-F76FBCBC6F35}" dt="2026-01-23T23:58:03.534" v="13" actId="20577"/>
           <ac:spMkLst>
             <pc:docMk/>
             <pc:sldMk cId="1038163257" sldId="475"/>
@@ -143,28 +143,35 @@
           </ac:spMkLst>
         </pc:spChg>
       </pc:sldChg>
-    </pc:docChg>
-  </pc:docChgLst>
-  <pc:docChgLst>
-    <pc:chgData name="Gerth Stølting Brodal" userId="04ef4784-6591-4f86-a140-f5c3b108582a" providerId="ADAL" clId="{950DEF30-CF5D-4D94-85A1-31677B492C68}"/>
-    <pc:docChg chg="undo custSel modSld">
-      <pc:chgData name="Gerth Stølting Brodal" userId="04ef4784-6591-4f86-a140-f5c3b108582a" providerId="ADAL" clId="{950DEF30-CF5D-4D94-85A1-31677B492C68}" dt="2024-05-13T07:01:49.743" v="64" actId="20577"/>
-      <pc:docMkLst>
-        <pc:docMk/>
-      </pc:docMkLst>
       <pc:sldChg chg="modSp mod">
-        <pc:chgData name="Gerth Stølting Brodal" userId="04ef4784-6591-4f86-a140-f5c3b108582a" providerId="ADAL" clId="{950DEF30-CF5D-4D94-85A1-31677B492C68}" dt="2024-05-11T19:17:54.177" v="9" actId="20577"/>
-        <pc:sldMkLst>
-          <pc:docMk/>
-          <pc:sldMk cId="1038163257" sldId="475"/>
-        </pc:sldMkLst>
-      </pc:sldChg>
-      <pc:sldChg chg="modSp mod modNotesTx">
-        <pc:chgData name="Gerth Stølting Brodal" userId="04ef4784-6591-4f86-a140-f5c3b108582a" providerId="ADAL" clId="{950DEF30-CF5D-4D94-85A1-31677B492C68}" dt="2024-05-13T07:01:49.743" v="64" actId="20577"/>
+        <pc:chgData name="Gerth Stølting Brodal" userId="04ef4784-6591-4f86-a140-f5c3b108582a" providerId="ADAL" clId="{EE2C17C0-1D70-424E-A6AD-F76FBCBC6F35}" dt="2026-01-23T23:58:40.959" v="31" actId="20577"/>
         <pc:sldMkLst>
           <pc:docMk/>
           <pc:sldMk cId="1270503327" sldId="703"/>
         </pc:sldMkLst>
+        <pc:spChg chg="mod">
+          <ac:chgData name="Gerth Stølting Brodal" userId="04ef4784-6591-4f86-a140-f5c3b108582a" providerId="ADAL" clId="{EE2C17C0-1D70-424E-A6AD-F76FBCBC6F35}" dt="2026-01-23T23:58:40.959" v="31" actId="20577"/>
+          <ac:spMkLst>
+            <pc:docMk/>
+            <pc:sldMk cId="1270503327" sldId="703"/>
+            <ac:spMk id="3" creationId="{00000000-0000-0000-0000-000000000000}"/>
+          </ac:spMkLst>
+        </pc:spChg>
+      </pc:sldChg>
+      <pc:sldChg chg="modSp mod">
+        <pc:chgData name="Gerth Stølting Brodal" userId="04ef4784-6591-4f86-a140-f5c3b108582a" providerId="ADAL" clId="{EE2C17C0-1D70-424E-A6AD-F76FBCBC6F35}" dt="2026-01-24T00:01:39.536" v="81" actId="1036"/>
+        <pc:sldMkLst>
+          <pc:docMk/>
+          <pc:sldMk cId="519874080" sldId="707"/>
+        </pc:sldMkLst>
+        <pc:spChg chg="mod">
+          <ac:chgData name="Gerth Stølting Brodal" userId="04ef4784-6591-4f86-a140-f5c3b108582a" providerId="ADAL" clId="{EE2C17C0-1D70-424E-A6AD-F76FBCBC6F35}" dt="2026-01-24T00:01:39.536" v="81" actId="1036"/>
+          <ac:spMkLst>
+            <pc:docMk/>
+            <pc:sldMk cId="519874080" sldId="707"/>
+            <ac:spMk id="3" creationId="{00000000-0000-0000-0000-000000000000}"/>
+          </ac:spMkLst>
+        </pc:spChg>
       </pc:sldChg>
     </pc:docChg>
   </pc:docChgLst>
@@ -253,7 +260,7 @@
           <a:p>
             <a:fld id="{FB1A172F-81D4-4DC4-9113-1DBD56EC3646}" type="datetimeFigureOut">
               <a:rPr lang="en-US" smtClean="0"/>
-              <a:t>5/11/2025</a:t>
+              <a:t>2026-01-24</a:t>
             </a:fld>
             <a:endParaRPr lang="en-US"/>
           </a:p>
@@ -825,7 +832,7 @@
           <a:p>
             <a:fld id="{0560A9CD-0304-4E0B-9E82-E7E0115DE05B}" type="datetimeFigureOut">
               <a:rPr lang="en-US" smtClean="0"/>
-              <a:t>5/11/2025</a:t>
+              <a:t>2026-01-24</a:t>
             </a:fld>
             <a:endParaRPr lang="en-US"/>
           </a:p>
@@ -993,7 +1000,7 @@
           <a:p>
             <a:fld id="{0560A9CD-0304-4E0B-9E82-E7E0115DE05B}" type="datetimeFigureOut">
               <a:rPr lang="en-US" smtClean="0"/>
-              <a:t>5/11/2025</a:t>
+              <a:t>2026-01-24</a:t>
             </a:fld>
             <a:endParaRPr lang="en-US"/>
           </a:p>
@@ -1171,7 +1178,7 @@
           <a:p>
             <a:fld id="{0560A9CD-0304-4E0B-9E82-E7E0115DE05B}" type="datetimeFigureOut">
               <a:rPr lang="en-US" smtClean="0"/>
-              <a:t>5/11/2025</a:t>
+              <a:t>2026-01-24</a:t>
             </a:fld>
             <a:endParaRPr lang="en-US"/>
           </a:p>
@@ -1354,7 +1361,7 @@
           <a:p>
             <a:fld id="{0560A9CD-0304-4E0B-9E82-E7E0115DE05B}" type="datetimeFigureOut">
               <a:rPr lang="en-US" smtClean="0"/>
-              <a:t>5/11/2025</a:t>
+              <a:t>2026-01-24</a:t>
             </a:fld>
             <a:endParaRPr lang="en-US"/>
           </a:p>
@@ -1599,7 +1606,7 @@
           <a:p>
             <a:fld id="{0560A9CD-0304-4E0B-9E82-E7E0115DE05B}" type="datetimeFigureOut">
               <a:rPr lang="en-US" smtClean="0"/>
-              <a:t>5/11/2025</a:t>
+              <a:t>2026-01-24</a:t>
             </a:fld>
             <a:endParaRPr lang="en-US"/>
           </a:p>
@@ -1828,7 +1835,7 @@
           <a:p>
             <a:fld id="{0560A9CD-0304-4E0B-9E82-E7E0115DE05B}" type="datetimeFigureOut">
               <a:rPr lang="en-US" smtClean="0"/>
-              <a:t>5/11/2025</a:t>
+              <a:t>2026-01-24</a:t>
             </a:fld>
             <a:endParaRPr lang="en-US"/>
           </a:p>
@@ -2192,7 +2199,7 @@
           <a:p>
             <a:fld id="{0560A9CD-0304-4E0B-9E82-E7E0115DE05B}" type="datetimeFigureOut">
               <a:rPr lang="en-US" smtClean="0"/>
-              <a:t>5/11/2025</a:t>
+              <a:t>2026-01-24</a:t>
             </a:fld>
             <a:endParaRPr lang="en-US"/>
           </a:p>
@@ -2309,7 +2316,7 @@
           <a:p>
             <a:fld id="{0560A9CD-0304-4E0B-9E82-E7E0115DE05B}" type="datetimeFigureOut">
               <a:rPr lang="en-US" smtClean="0"/>
-              <a:t>5/11/2025</a:t>
+              <a:t>2026-01-24</a:t>
             </a:fld>
             <a:endParaRPr lang="en-US"/>
           </a:p>
@@ -2404,7 +2411,7 @@
           <a:p>
             <a:fld id="{0560A9CD-0304-4E0B-9E82-E7E0115DE05B}" type="datetimeFigureOut">
               <a:rPr lang="en-US" smtClean="0"/>
-              <a:t>5/11/2025</a:t>
+              <a:t>2026-01-24</a:t>
             </a:fld>
             <a:endParaRPr lang="en-US"/>
           </a:p>
@@ -2679,7 +2686,7 @@
           <a:p>
             <a:fld id="{0560A9CD-0304-4E0B-9E82-E7E0115DE05B}" type="datetimeFigureOut">
               <a:rPr lang="en-US" smtClean="0"/>
-              <a:t>5/11/2025</a:t>
+              <a:t>2026-01-24</a:t>
             </a:fld>
             <a:endParaRPr lang="en-US"/>
           </a:p>
@@ -2931,7 +2938,7 @@
           <a:p>
             <a:fld id="{0560A9CD-0304-4E0B-9E82-E7E0115DE05B}" type="datetimeFigureOut">
               <a:rPr lang="en-US" smtClean="0"/>
-              <a:t>5/11/2025</a:t>
+              <a:t>2026-01-24</a:t>
             </a:fld>
             <a:endParaRPr lang="en-US"/>
           </a:p>
@@ -3142,7 +3149,7 @@
           <a:p>
             <a:fld id="{0560A9CD-0304-4E0B-9E82-E7E0115DE05B}" type="datetimeFigureOut">
               <a:rPr lang="en-US" smtClean="0"/>
-              <a:t>5/11/2025</a:t>
+              <a:t>2026-01-24</a:t>
             </a:fld>
             <a:endParaRPr lang="en-US"/>
           </a:p>
@@ -3579,13 +3586,13 @@
             </a:r>
             <a:r>
               <a:rPr lang="en-US" dirty="0"/>
-              <a:t>, deadline 16 May 2025</a:t>
+              <a:t>, deadline 15 May 2026</a:t>
             </a:r>
           </a:p>
           <a:p>
             <a:r>
               <a:rPr lang="en-US" dirty="0"/>
-              <a:t>Final project, deadline 31 May 2025</a:t>
+              <a:t>Final project, deadline 31 May 2026</a:t>
             </a:r>
             <a:endParaRPr lang="en-US" baseline="30000" dirty="0"/>
           </a:p>
@@ -3598,7 +3605,7 @@
           <a:p>
             <a:r>
               <a:rPr lang="en-US" dirty="0"/>
-              <a:t>Exam, 14 June 2025</a:t>
+              <a:t>Exam, 20 June 2026</a:t>
             </a:r>
           </a:p>
           <a:p>
@@ -3754,7 +3761,7 @@
           <a:p>
             <a:r>
               <a:rPr lang="en-US" b="1" dirty="0"/>
-              <a:t>5 hours, written exam, with aids, including PC and internet</a:t>
+              <a:t>5 hours, written exam, with aids, including PC but without internet</a:t>
             </a:r>
           </a:p>
           <a:p>
@@ -3784,15 +3791,7 @@
           <a:p>
             <a:r>
               <a:rPr lang="en-US" b="1" dirty="0"/>
-              <a:t>AI assistants like </a:t>
-            </a:r>
-            <a:r>
-              <a:rPr lang="en-US" b="1" dirty="0" err="1"/>
-              <a:t>ChatGPT</a:t>
-            </a:r>
-            <a:r>
-              <a:rPr lang="en-US" b="1" dirty="0"/>
-              <a:t> and GitHub Copilot are not allowed </a:t>
+              <a:t>AI assistants are not allowed </a:t>
             </a:r>
           </a:p>
           <a:p>
@@ -6014,8 +6013,8 @@
         </p:nvSpPr>
         <p:spPr>
           <a:xfrm>
-            <a:off x="838200" y="1797704"/>
-            <a:ext cx="10515600" cy="4351338"/>
+            <a:off x="838200" y="1823104"/>
+            <a:ext cx="11353800" cy="4351338"/>
           </a:xfrm>
         </p:spPr>
         <p:txBody>
@@ -6087,15 +6086,7 @@
           <a:p>
             <a:r>
               <a:rPr lang="en-US" dirty="0"/>
-              <a:t>Googling / stack overflow / Python documentation etc. </a:t>
-            </a:r>
-            <a:r>
-              <a:rPr lang="en-US" b="1" dirty="0"/>
-              <a:t>is allowed</a:t>
-            </a:r>
-            <a:r>
-              <a:rPr lang="en-US" dirty="0"/>
-              <a:t>, but put a </a:t>
+              <a:t>Put a </a:t>
             </a:r>
             <a:r>
               <a:rPr lang="en-US" b="1" dirty="0">
@@ -6103,7 +6094,7 @@
                   <a:srgbClr val="C00000"/>
                 </a:solidFill>
               </a:rPr>
-              <a:t>comment if you copied code from internet </a:t>
+              <a:t>comment if you copied code from exercises/slides/documentation </a:t>
             </a:r>
             <a:r>
               <a:rPr lang="en-US" dirty="0"/>

</xml_diff>